<commit_message>
data gen for Yen's k shortest paths
</commit_message>
<xml_diff>
--- a/docs/argonne_weekly_update.pptx
+++ b/docs/argonne_weekly_update.pptx
@@ -20,6 +20,8 @@
     <p:sldId id="268" r:id="rId14"/>
     <p:sldId id="269" r:id="rId15"/>
     <p:sldId id="270" r:id="rId16"/>
+    <p:sldId id="271" r:id="rId17"/>
+    <p:sldId id="272" r:id="rId18"/>
   </p:sldIdLst>
   <p:sldSz cx="9144000" cy="6858000" type="screen4x3"/>
   <p:notesSz cx="6858000" cy="9144000"/>
@@ -138,6 +140,8 @@
             <p14:sldId id="268"/>
             <p14:sldId id="269"/>
             <p14:sldId id="270"/>
+            <p14:sldId id="271"/>
+            <p14:sldId id="272"/>
           </p14:sldIdLst>
         </p14:section>
       </p14:sectionLst>
@@ -327,7 +331,7 @@
           <a:p>
             <a:fld id="{845E5202-FE1C-7248-B986-0C23BA3B595C}" type="datetimeFigureOut">
               <a:rPr lang="en-US" smtClean="0"/>
-              <a:t>12/19/14</a:t>
+              <a:t>1/19/15</a:t>
             </a:fld>
             <a:endParaRPr lang="en-US"/>
           </a:p>
@@ -497,7 +501,7 @@
           <a:p>
             <a:fld id="{845E5202-FE1C-7248-B986-0C23BA3B595C}" type="datetimeFigureOut">
               <a:rPr lang="en-US" smtClean="0"/>
-              <a:t>12/19/14</a:t>
+              <a:t>1/19/15</a:t>
             </a:fld>
             <a:endParaRPr lang="en-US"/>
           </a:p>
@@ -677,7 +681,7 @@
           <a:p>
             <a:fld id="{845E5202-FE1C-7248-B986-0C23BA3B595C}" type="datetimeFigureOut">
               <a:rPr lang="en-US" smtClean="0"/>
-              <a:t>12/19/14</a:t>
+              <a:t>1/19/15</a:t>
             </a:fld>
             <a:endParaRPr lang="en-US"/>
           </a:p>
@@ -847,7 +851,7 @@
           <a:p>
             <a:fld id="{845E5202-FE1C-7248-B986-0C23BA3B595C}" type="datetimeFigureOut">
               <a:rPr lang="en-US" smtClean="0"/>
-              <a:t>12/19/14</a:t>
+              <a:t>1/19/15</a:t>
             </a:fld>
             <a:endParaRPr lang="en-US"/>
           </a:p>
@@ -1093,7 +1097,7 @@
           <a:p>
             <a:fld id="{845E5202-FE1C-7248-B986-0C23BA3B595C}" type="datetimeFigureOut">
               <a:rPr lang="en-US" smtClean="0"/>
-              <a:t>12/19/14</a:t>
+              <a:t>1/19/15</a:t>
             </a:fld>
             <a:endParaRPr lang="en-US"/>
           </a:p>
@@ -1381,7 +1385,7 @@
           <a:p>
             <a:fld id="{845E5202-FE1C-7248-B986-0C23BA3B595C}" type="datetimeFigureOut">
               <a:rPr lang="en-US" smtClean="0"/>
-              <a:t>12/19/14</a:t>
+              <a:t>1/19/15</a:t>
             </a:fld>
             <a:endParaRPr lang="en-US"/>
           </a:p>
@@ -1803,7 +1807,7 @@
           <a:p>
             <a:fld id="{845E5202-FE1C-7248-B986-0C23BA3B595C}" type="datetimeFigureOut">
               <a:rPr lang="en-US" smtClean="0"/>
-              <a:t>12/19/14</a:t>
+              <a:t>1/19/15</a:t>
             </a:fld>
             <a:endParaRPr lang="en-US"/>
           </a:p>
@@ -1921,7 +1925,7 @@
           <a:p>
             <a:fld id="{845E5202-FE1C-7248-B986-0C23BA3B595C}" type="datetimeFigureOut">
               <a:rPr lang="en-US" smtClean="0"/>
-              <a:t>12/19/14</a:t>
+              <a:t>1/19/15</a:t>
             </a:fld>
             <a:endParaRPr lang="en-US"/>
           </a:p>
@@ -2016,7 +2020,7 @@
           <a:p>
             <a:fld id="{845E5202-FE1C-7248-B986-0C23BA3B595C}" type="datetimeFigureOut">
               <a:rPr lang="en-US" smtClean="0"/>
-              <a:t>12/19/14</a:t>
+              <a:t>1/19/15</a:t>
             </a:fld>
             <a:endParaRPr lang="en-US"/>
           </a:p>
@@ -2293,7 +2297,7 @@
           <a:p>
             <a:fld id="{845E5202-FE1C-7248-B986-0C23BA3B595C}" type="datetimeFigureOut">
               <a:rPr lang="en-US" smtClean="0"/>
-              <a:t>12/19/14</a:t>
+              <a:t>1/19/15</a:t>
             </a:fld>
             <a:endParaRPr lang="en-US"/>
           </a:p>
@@ -2546,7 +2550,7 @@
           <a:p>
             <a:fld id="{845E5202-FE1C-7248-B986-0C23BA3B595C}" type="datetimeFigureOut">
               <a:rPr lang="en-US" smtClean="0"/>
-              <a:t>12/19/14</a:t>
+              <a:t>1/19/15</a:t>
             </a:fld>
             <a:endParaRPr lang="en-US"/>
           </a:p>
@@ -2759,7 +2763,7 @@
           <a:p>
             <a:fld id="{845E5202-FE1C-7248-B986-0C23BA3B595C}" type="datetimeFigureOut">
               <a:rPr lang="en-US" smtClean="0"/>
-              <a:t>12/19/14</a:t>
+              <a:t>1/19/15</a:t>
             </a:fld>
             <a:endParaRPr lang="en-US"/>
           </a:p>
@@ -4534,6 +4538,332 @@
   <p:clrMapOvr>
     <a:masterClrMapping/>
   </p:clrMapOvr>
+  <p:timing>
+    <p:tnLst>
+      <p:par>
+        <p:cTn xmlns:p14="http://schemas.microsoft.com/office/powerpoint/2010/main" id="1" dur="indefinite" restart="never" nodeType="tmRoot"/>
+      </p:par>
+    </p:tnLst>
+  </p:timing>
+</p:sld>
+</file>
+
+<file path=ppt/slides/slide16.xml><?xml version="1.0" encoding="utf-8"?>
+<p:sld xmlns:a="http://schemas.openxmlformats.org/drawingml/2006/main" xmlns:r="http://schemas.openxmlformats.org/officeDocument/2006/relationships" xmlns:p="http://schemas.openxmlformats.org/presentationml/2006/main">
+  <p:cSld>
+    <p:spTree>
+      <p:nvGrpSpPr>
+        <p:cNvPr id="1" name=""/>
+        <p:cNvGrpSpPr/>
+        <p:nvPr/>
+      </p:nvGrpSpPr>
+      <p:grpSpPr>
+        <a:xfrm>
+          <a:off x="0" y="0"/>
+          <a:ext cx="0" cy="0"/>
+          <a:chOff x="0" y="0"/>
+          <a:chExt cx="0" cy="0"/>
+        </a:xfrm>
+      </p:grpSpPr>
+      <p:sp>
+        <p:nvSpPr>
+          <p:cNvPr id="2" name="Title 1"/>
+          <p:cNvSpPr>
+            <a:spLocks noGrp="1"/>
+          </p:cNvSpPr>
+          <p:nvPr>
+            <p:ph type="title"/>
+          </p:nvPr>
+        </p:nvSpPr>
+        <p:spPr/>
+        <p:txBody>
+          <a:bodyPr/>
+          <a:lstStyle/>
+          <a:p>
+            <a:r>
+              <a:rPr lang="en-US" dirty="0" smtClean="0"/>
+              <a:t>Update Jan 19, 2015</a:t>
+            </a:r>
+            <a:endParaRPr lang="en-US" dirty="0"/>
+          </a:p>
+        </p:txBody>
+      </p:sp>
+      <p:sp>
+        <p:nvSpPr>
+          <p:cNvPr id="3" name="Content Placeholder 2"/>
+          <p:cNvSpPr>
+            <a:spLocks noGrp="1"/>
+          </p:cNvSpPr>
+          <p:nvPr>
+            <p:ph idx="1"/>
+          </p:nvPr>
+        </p:nvSpPr>
+        <p:spPr/>
+        <p:txBody>
+          <a:bodyPr>
+            <a:normAutofit fontScale="77500" lnSpcReduction="20000"/>
+          </a:bodyPr>
+          <a:lstStyle/>
+          <a:p>
+            <a:r>
+              <a:rPr lang="en-US" dirty="0" smtClean="0"/>
+              <a:t>Implemented 256 to 4 nodes data movement:</a:t>
+            </a:r>
+          </a:p>
+          <a:p>
+            <a:pPr lvl="1"/>
+            <a:r>
+              <a:rPr lang="en-US" dirty="0" smtClean="0"/>
+              <a:t>Every node in 256 nodes transfers 1M of data to all 4 </a:t>
+            </a:r>
+            <a:r>
+              <a:rPr lang="en-US" dirty="0" err="1" smtClean="0"/>
+              <a:t>dests</a:t>
+            </a:r>
+            <a:r>
+              <a:rPr lang="en-US" dirty="0" smtClean="0"/>
+              <a:t> (32, 96, 160, 224).</a:t>
+            </a:r>
+          </a:p>
+          <a:p>
+            <a:pPr lvl="1"/>
+            <a:r>
+              <a:rPr lang="en-US" dirty="0" smtClean="0"/>
+              <a:t>Path computing: 180,000 microseconds.</a:t>
+            </a:r>
+          </a:p>
+          <a:p>
+            <a:pPr lvl="1"/>
+            <a:r>
+              <a:rPr lang="en-US" dirty="0" smtClean="0"/>
+              <a:t>Data movement (PAMI + pipeline): ~45,000 microseconds.</a:t>
+            </a:r>
+          </a:p>
+          <a:p>
+            <a:pPr lvl="1"/>
+            <a:r>
+              <a:rPr lang="en-US" dirty="0" smtClean="0"/>
+              <a:t>The data movement only: 20GB/s.</a:t>
+            </a:r>
+          </a:p>
+          <a:p>
+            <a:pPr lvl="1"/>
+            <a:r>
+              <a:rPr lang="en-US" dirty="0" err="1" smtClean="0"/>
+              <a:t>Alltoallv</a:t>
+            </a:r>
+            <a:r>
+              <a:rPr lang="en-US" dirty="0" smtClean="0"/>
+              <a:t>: 110K microsecond or 9GB/s.</a:t>
+            </a:r>
+          </a:p>
+          <a:p>
+            <a:r>
+              <a:rPr lang="en-US" dirty="0" smtClean="0"/>
+              <a:t>Performance investigation:</a:t>
+            </a:r>
+          </a:p>
+          <a:p>
+            <a:pPr lvl="1"/>
+            <a:r>
+              <a:rPr lang="en-US" dirty="0" smtClean="0"/>
+              <a:t>Reduce path computing to 16,000 microseconds.</a:t>
+            </a:r>
+          </a:p>
+          <a:p>
+            <a:pPr lvl="1"/>
+            <a:r>
+              <a:rPr lang="en-US" dirty="0" smtClean="0"/>
+              <a:t>On-fly path computing and data movement: 60K microsecond or 16GB/s.</a:t>
+            </a:r>
+          </a:p>
+          <a:p>
+            <a:pPr lvl="1"/>
+            <a:r>
+              <a:rPr lang="en-US" dirty="0" smtClean="0"/>
+              <a:t>Potentially we can get more. Need to do more investigation.</a:t>
+            </a:r>
+          </a:p>
+          <a:p>
+            <a:r>
+              <a:rPr lang="en-US" dirty="0" smtClean="0"/>
+              <a:t>Generalized to m to n data movement algorithm using BFS.</a:t>
+            </a:r>
+          </a:p>
+        </p:txBody>
+      </p:sp>
+    </p:spTree>
+    <p:extLst>
+      <p:ext uri="{BB962C8B-B14F-4D97-AF65-F5344CB8AC3E}">
+        <p14:creationId xmlns:p14="http://schemas.microsoft.com/office/powerpoint/2010/main" val="1195147939"/>
+      </p:ext>
+    </p:extLst>
+  </p:cSld>
+  <p:clrMapOvr>
+    <a:masterClrMapping/>
+  </p:clrMapOvr>
+  <p:timing>
+    <p:tnLst>
+      <p:par>
+        <p:cTn xmlns:p14="http://schemas.microsoft.com/office/powerpoint/2010/main" id="1" dur="indefinite" restart="never" nodeType="tmRoot"/>
+      </p:par>
+    </p:tnLst>
+  </p:timing>
+</p:sld>
+</file>
+
+<file path=ppt/slides/slide17.xml><?xml version="1.0" encoding="utf-8"?>
+<p:sld xmlns:a="http://schemas.openxmlformats.org/drawingml/2006/main" xmlns:r="http://schemas.openxmlformats.org/officeDocument/2006/relationships" xmlns:p="http://schemas.openxmlformats.org/presentationml/2006/main">
+  <p:cSld>
+    <p:spTree>
+      <p:nvGrpSpPr>
+        <p:cNvPr id="1" name=""/>
+        <p:cNvGrpSpPr/>
+        <p:nvPr/>
+      </p:nvGrpSpPr>
+      <p:grpSpPr>
+        <a:xfrm>
+          <a:off x="0" y="0"/>
+          <a:ext cx="0" cy="0"/>
+          <a:chOff x="0" y="0"/>
+          <a:chExt cx="0" cy="0"/>
+        </a:xfrm>
+      </p:grpSpPr>
+      <p:sp>
+        <p:nvSpPr>
+          <p:cNvPr id="2" name="Title 1"/>
+          <p:cNvSpPr>
+            <a:spLocks noGrp="1"/>
+          </p:cNvSpPr>
+          <p:nvPr>
+            <p:ph type="title"/>
+          </p:nvPr>
+        </p:nvSpPr>
+        <p:spPr/>
+        <p:txBody>
+          <a:bodyPr/>
+          <a:lstStyle/>
+          <a:p>
+            <a:r>
+              <a:rPr lang="en-US" dirty="0" smtClean="0"/>
+              <a:t>Update Jan 19, 2015</a:t>
+            </a:r>
+            <a:endParaRPr lang="en-US" dirty="0"/>
+          </a:p>
+        </p:txBody>
+      </p:sp>
+      <p:sp>
+        <p:nvSpPr>
+          <p:cNvPr id="3" name="Content Placeholder 2"/>
+          <p:cNvSpPr>
+            <a:spLocks noGrp="1"/>
+          </p:cNvSpPr>
+          <p:nvPr>
+            <p:ph idx="1"/>
+          </p:nvPr>
+        </p:nvSpPr>
+        <p:spPr/>
+        <p:txBody>
+          <a:bodyPr>
+            <a:normAutofit fontScale="85000" lnSpcReduction="20000"/>
+          </a:bodyPr>
+          <a:lstStyle/>
+          <a:p>
+            <a:r>
+              <a:rPr lang="en-US" dirty="0" smtClean="0"/>
+              <a:t>Weird issue:</a:t>
+            </a:r>
+          </a:p>
+          <a:p>
+            <a:pPr lvl="1"/>
+            <a:r>
+              <a:rPr lang="en-US" dirty="0" smtClean="0"/>
+              <a:t>If initialize PAMI after most of the memory allocations, we can get better performance.</a:t>
+            </a:r>
+          </a:p>
+          <a:p>
+            <a:r>
+              <a:rPr lang="en-US" dirty="0" smtClean="0"/>
+              <a:t>This week:</a:t>
+            </a:r>
+          </a:p>
+          <a:p>
+            <a:pPr lvl="1"/>
+            <a:r>
+              <a:rPr lang="en-US" dirty="0"/>
+              <a:t>Clean code for Paul.</a:t>
+            </a:r>
+          </a:p>
+          <a:p>
+            <a:pPr lvl="1"/>
+            <a:r>
+              <a:rPr lang="en-US" dirty="0" smtClean="0"/>
+              <a:t>Model.</a:t>
+            </a:r>
+          </a:p>
+          <a:p>
+            <a:pPr lvl="1"/>
+            <a:r>
+              <a:rPr lang="en-US" dirty="0" smtClean="0"/>
+              <a:t>More on performance improvement.</a:t>
+            </a:r>
+          </a:p>
+          <a:p>
+            <a:r>
+              <a:rPr lang="en-US" dirty="0" smtClean="0"/>
+              <a:t>Upcoming conferences: </a:t>
+            </a:r>
+          </a:p>
+          <a:p>
+            <a:pPr lvl="1"/>
+            <a:r>
+              <a:rPr lang="en-US" dirty="0" smtClean="0"/>
+              <a:t>Cluster (Feb 27)</a:t>
+            </a:r>
+          </a:p>
+          <a:p>
+            <a:r>
+              <a:rPr lang="en-US" dirty="0" smtClean="0"/>
+              <a:t> Thesis:</a:t>
+            </a:r>
+          </a:p>
+          <a:p>
+            <a:pPr lvl="1"/>
+            <a:r>
+              <a:rPr lang="en-US" dirty="0" smtClean="0"/>
+              <a:t>June 26: file for graduation.</a:t>
+            </a:r>
+          </a:p>
+          <a:p>
+            <a:pPr lvl="1"/>
+            <a:r>
+              <a:rPr lang="en-US" dirty="0" smtClean="0"/>
+              <a:t>July 24: submit defended/approved thesis.</a:t>
+            </a:r>
+          </a:p>
+          <a:p>
+            <a:pPr lvl="1"/>
+            <a:endParaRPr lang="en-US" dirty="0"/>
+          </a:p>
+        </p:txBody>
+      </p:sp>
+    </p:spTree>
+    <p:extLst>
+      <p:ext uri="{BB962C8B-B14F-4D97-AF65-F5344CB8AC3E}">
+        <p14:creationId xmlns:p14="http://schemas.microsoft.com/office/powerpoint/2010/main" val="2747040717"/>
+      </p:ext>
+    </p:extLst>
+  </p:cSld>
+  <p:clrMapOvr>
+    <a:masterClrMapping/>
+  </p:clrMapOvr>
+  <p:timing>
+    <p:tnLst>
+      <p:par>
+        <p:cTn xmlns:p14="http://schemas.microsoft.com/office/powerpoint/2010/main" id="1" dur="indefinite" restart="never" nodeType="tmRoot"/>
+      </p:par>
+    </p:tnLst>
+  </p:timing>
 </p:sld>
 </file>
 

</xml_diff>